<commit_message>
Added octocat to presentation
</commit_message>
<xml_diff>
--- a/doc/presentation.pptx
+++ b/doc/presentation.pptx
@@ -116,6 +116,11 @@
       </a:defRPr>
     </a:lvl9pPr>
   </p:defaultTextStyle>
+  <p:extLst>
+    <p:ext uri="{EFAFB233-063F-42B5-8137-9DF3F51BA10A}">
+      <p15:sldGuideLst xmlns:p15="http://schemas.microsoft.com/office/powerpoint/2012/main"/>
+    </p:ext>
+  </p:extLst>
 </p:presentation>
 </file>
 
@@ -296,7 +301,6 @@
               <a:rPr lang="en-US"/>
               <a:t>Fifth level</a:t>
             </a:r>
-            <a:endParaRPr lang="en-US"/>
           </a:p>
         </p:txBody>
       </p:sp>
@@ -514,7 +518,6 @@
               <a:rPr lang="en-US"/>
               <a:t>Click to edit Master title style</a:t>
             </a:r>
-            <a:endParaRPr lang="en-US"/>
           </a:p>
         </p:txBody>
       </p:sp>
@@ -579,7 +582,6 @@
               <a:rPr lang="en-US"/>
               <a:t>Click to edit Master subtitle style</a:t>
             </a:r>
-            <a:endParaRPr lang="en-US"/>
           </a:p>
         </p:txBody>
       </p:sp>
@@ -697,7 +699,6 @@
               <a:rPr lang="en-US"/>
               <a:t>Click to edit Master title style</a:t>
             </a:r>
-            <a:endParaRPr lang="en-US"/>
           </a:p>
         </p:txBody>
       </p:sp>
@@ -749,7 +750,6 @@
               <a:rPr lang="en-US"/>
               <a:t>Fifth level</a:t>
             </a:r>
-            <a:endParaRPr lang="en-US"/>
           </a:p>
         </p:txBody>
       </p:sp>
@@ -872,7 +872,6 @@
               <a:rPr lang="en-US"/>
               <a:t>Click to edit Master title style</a:t>
             </a:r>
-            <a:endParaRPr lang="en-US"/>
           </a:p>
         </p:txBody>
       </p:sp>
@@ -929,7 +928,6 @@
               <a:rPr lang="en-US"/>
               <a:t>Fifth level</a:t>
             </a:r>
-            <a:endParaRPr lang="en-US"/>
           </a:p>
         </p:txBody>
       </p:sp>
@@ -1047,7 +1045,6 @@
               <a:rPr lang="en-US"/>
               <a:t>Click to edit Master title style</a:t>
             </a:r>
-            <a:endParaRPr lang="en-US"/>
           </a:p>
         </p:txBody>
       </p:sp>
@@ -1099,7 +1096,6 @@
               <a:rPr lang="en-US"/>
               <a:t>Fifth level</a:t>
             </a:r>
-            <a:endParaRPr lang="en-US"/>
           </a:p>
         </p:txBody>
       </p:sp>
@@ -1226,7 +1222,6 @@
               <a:rPr lang="en-US"/>
               <a:t>Click to edit Master title style</a:t>
             </a:r>
-            <a:endParaRPr lang="en-US"/>
           </a:p>
         </p:txBody>
       </p:sp>
@@ -1463,7 +1458,6 @@
               <a:rPr lang="en-US"/>
               <a:t>Click to edit Master title style</a:t>
             </a:r>
-            <a:endParaRPr lang="en-US"/>
           </a:p>
         </p:txBody>
       </p:sp>
@@ -1520,7 +1514,6 @@
               <a:rPr lang="en-US"/>
               <a:t>Fifth level</a:t>
             </a:r>
-            <a:endParaRPr lang="en-US"/>
           </a:p>
         </p:txBody>
       </p:sp>
@@ -1577,7 +1570,6 @@
               <a:rPr lang="en-US"/>
               <a:t>Fifth level</a:t>
             </a:r>
-            <a:endParaRPr lang="en-US"/>
           </a:p>
         </p:txBody>
       </p:sp>
@@ -1700,7 +1692,6 @@
               <a:rPr lang="en-US"/>
               <a:t>Click to edit Master title style</a:t>
             </a:r>
-            <a:endParaRPr lang="en-US"/>
           </a:p>
         </p:txBody>
       </p:sp>
@@ -1822,7 +1813,6 @@
               <a:rPr lang="en-US"/>
               <a:t>Fifth level</a:t>
             </a:r>
-            <a:endParaRPr lang="en-US"/>
           </a:p>
         </p:txBody>
       </p:sp>
@@ -1944,7 +1934,6 @@
               <a:rPr lang="en-US"/>
               <a:t>Fifth level</a:t>
             </a:r>
-            <a:endParaRPr lang="en-US"/>
           </a:p>
         </p:txBody>
       </p:sp>
@@ -2062,7 +2051,6 @@
               <a:rPr lang="en-US"/>
               <a:t>Click to edit Master title style</a:t>
             </a:r>
-            <a:endParaRPr lang="en-US"/>
           </a:p>
         </p:txBody>
       </p:sp>
@@ -2284,7 +2272,6 @@
               <a:rPr lang="en-US"/>
               <a:t>Click to edit Master title style</a:t>
             </a:r>
-            <a:endParaRPr lang="en-US"/>
           </a:p>
         </p:txBody>
       </p:sp>
@@ -2369,7 +2356,6 @@
               <a:rPr lang="en-US"/>
               <a:t>Fifth level</a:t>
             </a:r>
-            <a:endParaRPr lang="en-US"/>
           </a:p>
         </p:txBody>
       </p:sp>
@@ -2561,7 +2547,6 @@
               <a:rPr lang="en-US"/>
               <a:t>Click to edit Master title style</a:t>
             </a:r>
-            <a:endParaRPr lang="en-US"/>
           </a:p>
         </p:txBody>
       </p:sp>
@@ -2820,7 +2805,6 @@
               <a:rPr lang="en-US"/>
               <a:t>Click to edit Master title style</a:t>
             </a:r>
-            <a:endParaRPr lang="en-US"/>
           </a:p>
         </p:txBody>
       </p:sp>
@@ -2882,7 +2866,6 @@
               <a:rPr lang="en-US"/>
               <a:t>Fifth level</a:t>
             </a:r>
-            <a:endParaRPr lang="en-US"/>
           </a:p>
         </p:txBody>
       </p:sp>
@@ -3624,6 +3607,36 @@
           </a:p>
         </p:txBody>
       </p:sp>
+      <p:pic>
+        <p:nvPicPr>
+          <p:cNvPr id="5" name="Picture 4"/>
+          <p:cNvPicPr>
+            <a:picLocks noChangeAspect="1"/>
+          </p:cNvPicPr>
+          <p:nvPr/>
+        </p:nvPicPr>
+        <p:blipFill>
+          <a:blip r:embed="rId2">
+            <a:extLst>
+              <a:ext uri="{28A0092B-C50C-407E-A947-70E740481C1C}">
+                <a14:useLocalDpi xmlns:a14="http://schemas.microsoft.com/office/drawing/2010/main" val="0"/>
+              </a:ext>
+            </a:extLst>
+          </a:blip>
+          <a:stretch>
+            <a:fillRect/>
+          </a:stretch>
+        </p:blipFill>
+        <p:spPr>
+          <a:xfrm>
+            <a:off x="8214870" y="3964168"/>
+            <a:ext cx="2247900" cy="2247900"/>
+          </a:xfrm>
+          <a:prstGeom prst="rect">
+            <a:avLst/>
+          </a:prstGeom>
+        </p:spPr>
+      </p:pic>
     </p:spTree>
     <p:extLst>
       <p:ext uri="{BB962C8B-B14F-4D97-AF65-F5344CB8AC3E}">

</xml_diff>

<commit_message>
New running time and accuracy figures in presentation
</commit_message>
<xml_diff>
--- a/doc/presentation.pptx
+++ b/doc/presentation.pptx
@@ -4573,7 +4573,7 @@
             <p:ph idx="1"/>
             <p:extLst>
               <p:ext uri="{D42A27DB-BD31-4B8C-83A1-F6EECF244321}">
-                <p14:modId xmlns:p14="http://schemas.microsoft.com/office/powerpoint/2010/main" val="285484905"/>
+                <p14:modId xmlns:p14="http://schemas.microsoft.com/office/powerpoint/2010/main" val="31708464"/>
               </p:ext>
             </p:extLst>
           </p:nvPr>
@@ -4768,22 +4768,32 @@
                       <a:pPr lvl="1"/>
                       <a:r>
                         <a:rPr lang="en-US" dirty="0"/>
-                        <a:t>Running time: 66 secs</a:t>
+                        <a:t>Running time: 50.9 secs</a:t>
                       </a:r>
                     </a:p>
                     <a:p>
                       <a:pPr lvl="1"/>
                       <a:r>
                         <a:rPr lang="en-US" dirty="0"/>
-                        <a:t>Training accuracy: 74.06%</a:t>
+                        <a:t>Training accuracy</a:t>
                       </a:r>
+                      <a:r>
+                        <a:rPr lang="en-US"/>
+                        <a:t>: 72.58%</a:t>
+                      </a:r>
+                      <a:endParaRPr lang="en-US" dirty="0"/>
                     </a:p>
                     <a:p>
                       <a:pPr lvl="1"/>
                       <a:r>
                         <a:rPr lang="en-US" dirty="0"/>
-                        <a:t>Testing accuracy: 68.54%</a:t>
+                        <a:t>Testing accuracy</a:t>
                       </a:r>
+                      <a:r>
+                        <a:rPr lang="en-US"/>
+                        <a:t>: 69.09%</a:t>
+                      </a:r>
+                      <a:endParaRPr lang="en-US" dirty="0"/>
                     </a:p>
                     <a:p>
                       <a:endParaRPr lang="en-US" dirty="0"/>
@@ -4799,21 +4809,21 @@
                       <a:pPr lvl="1"/>
                       <a:r>
                         <a:rPr lang="en-US" dirty="0"/>
-                        <a:t>Running time: 525.5 secs</a:t>
+                        <a:t>Running time: 416.6 secs</a:t>
                       </a:r>
                     </a:p>
                     <a:p>
                       <a:pPr lvl="1"/>
                       <a:r>
                         <a:rPr lang="en-US" dirty="0"/>
-                        <a:t>Training accuracy: 80.3%</a:t>
+                        <a:t>Training accuracy: 78.98%</a:t>
                       </a:r>
                     </a:p>
                     <a:p>
                       <a:pPr lvl="1"/>
                       <a:r>
                         <a:rPr lang="en-US" dirty="0"/>
-                        <a:t>Testing accuracy: 72.51% </a:t>
+                        <a:t>Testing accuracy: 72.13% </a:t>
                       </a:r>
                     </a:p>
                   </a:txBody>
@@ -4861,7 +4871,7 @@
             </a:r>
             <a:r>
               <a:rPr lang="en-US" dirty="0"/>
-              <a:t> with spatial color histogram and harmonic coefficient features, takes much longer to run than the baseline but also correctly classified around 120-130 additional images on testing data.</a:t>
+              <a:t> with spatial color histogram and harmonic coefficient features, using 40 weak learners, takes much longer to run than the baseline but also correctly classified around 120-130 additional images on testing data.</a:t>
             </a:r>
           </a:p>
           <a:p>

</xml_diff>